<commit_message>
edit why machine learning_c60c593aab53bd0a44ed8d2d7c5f6889 and add new.md
</commit_message>
<xml_diff>
--- a/why machine learning_c60c593aab53bd0a44ed8d2d7c5f6889.pptx
+++ b/why machine learning_c60c593aab53bd0a44ed8d2d7c5f6889.pptx
@@ -296,7 +296,7 @@
             <a:fld id="{C47B34E2-58C0-4F30-8FF3-C556032344A1}" type="datetimeFigureOut">
               <a:rPr lang="en-US" smtClean="0"/>
               <a:pPr/>
-              <a:t>12/12/2019</a:t>
+              <a:t>1/27/2020</a:t>
             </a:fld>
             <a:endParaRPr lang="en-US"/>
           </a:p>
@@ -463,7 +463,7 @@
             <a:fld id="{C47B34E2-58C0-4F30-8FF3-C556032344A1}" type="datetimeFigureOut">
               <a:rPr lang="en-US" smtClean="0"/>
               <a:pPr/>
-              <a:t>12/12/2019</a:t>
+              <a:t>1/27/2020</a:t>
             </a:fld>
             <a:endParaRPr lang="en-US"/>
           </a:p>
@@ -640,7 +640,7 @@
             <a:fld id="{C47B34E2-58C0-4F30-8FF3-C556032344A1}" type="datetimeFigureOut">
               <a:rPr lang="en-US" smtClean="0"/>
               <a:pPr/>
-              <a:t>12/12/2019</a:t>
+              <a:t>1/27/2020</a:t>
             </a:fld>
             <a:endParaRPr lang="en-US"/>
           </a:p>
@@ -807,7 +807,7 @@
             <a:fld id="{C47B34E2-58C0-4F30-8FF3-C556032344A1}" type="datetimeFigureOut">
               <a:rPr lang="en-US" smtClean="0"/>
               <a:pPr/>
-              <a:t>12/12/2019</a:t>
+              <a:t>1/27/2020</a:t>
             </a:fld>
             <a:endParaRPr lang="en-US"/>
           </a:p>
@@ -1050,7 +1050,7 @@
             <a:fld id="{C47B34E2-58C0-4F30-8FF3-C556032344A1}" type="datetimeFigureOut">
               <a:rPr lang="en-US" smtClean="0"/>
               <a:pPr/>
-              <a:t>12/12/2019</a:t>
+              <a:t>1/27/2020</a:t>
             </a:fld>
             <a:endParaRPr lang="en-US"/>
           </a:p>
@@ -1335,7 +1335,7 @@
             <a:fld id="{C47B34E2-58C0-4F30-8FF3-C556032344A1}" type="datetimeFigureOut">
               <a:rPr lang="en-US" smtClean="0"/>
               <a:pPr/>
-              <a:t>12/12/2019</a:t>
+              <a:t>1/27/2020</a:t>
             </a:fld>
             <a:endParaRPr lang="en-US"/>
           </a:p>
@@ -1754,7 +1754,7 @@
             <a:fld id="{C47B34E2-58C0-4F30-8FF3-C556032344A1}" type="datetimeFigureOut">
               <a:rPr lang="en-US" smtClean="0"/>
               <a:pPr/>
-              <a:t>12/12/2019</a:t>
+              <a:t>1/27/2020</a:t>
             </a:fld>
             <a:endParaRPr lang="en-US"/>
           </a:p>
@@ -1869,7 +1869,7 @@
             <a:fld id="{C47B34E2-58C0-4F30-8FF3-C556032344A1}" type="datetimeFigureOut">
               <a:rPr lang="en-US" smtClean="0"/>
               <a:pPr/>
-              <a:t>12/12/2019</a:t>
+              <a:t>1/27/2020</a:t>
             </a:fld>
             <a:endParaRPr lang="en-US"/>
           </a:p>
@@ -1961,7 +1961,7 @@
             <a:fld id="{C47B34E2-58C0-4F30-8FF3-C556032344A1}" type="datetimeFigureOut">
               <a:rPr lang="en-US" smtClean="0"/>
               <a:pPr/>
-              <a:t>12/12/2019</a:t>
+              <a:t>1/27/2020</a:t>
             </a:fld>
             <a:endParaRPr lang="en-US"/>
           </a:p>
@@ -2235,7 +2235,7 @@
             <a:fld id="{C47B34E2-58C0-4F30-8FF3-C556032344A1}" type="datetimeFigureOut">
               <a:rPr lang="en-US" smtClean="0"/>
               <a:pPr/>
-              <a:t>12/12/2019</a:t>
+              <a:t>1/27/2020</a:t>
             </a:fld>
             <a:endParaRPr lang="en-US"/>
           </a:p>
@@ -2485,7 +2485,7 @@
             <a:fld id="{C47B34E2-58C0-4F30-8FF3-C556032344A1}" type="datetimeFigureOut">
               <a:rPr lang="en-US" smtClean="0"/>
               <a:pPr/>
-              <a:t>12/12/2019</a:t>
+              <a:t>1/27/2020</a:t>
             </a:fld>
             <a:endParaRPr lang="en-US"/>
           </a:p>
@@ -2695,7 +2695,7 @@
             <a:fld id="{C47B34E2-58C0-4F30-8FF3-C556032344A1}" type="datetimeFigureOut">
               <a:rPr lang="en-US" smtClean="0"/>
               <a:pPr/>
-              <a:t>12/12/2019</a:t>
+              <a:t>1/27/2020</a:t>
             </a:fld>
             <a:endParaRPr lang="en-US"/>
           </a:p>
@@ -3165,8 +3165,16 @@
           <a:p>
             <a:pPr algn="just"/>
             <a:r>
+              <a:rPr lang="en-US" sz="2800" smtClean="0"/>
+              <a:t>By </a:t>
+            </a:r>
+            <a:r>
+              <a:rPr lang="en-US" sz="2800" smtClean="0"/>
+              <a:t>Arthur </a:t>
+            </a:r>
+            <a:r>
               <a:rPr lang="en-US" sz="2800" dirty="0"/>
-              <a:t>—Arthur Samuel, </a:t>
+              <a:t>Samuel, </a:t>
             </a:r>
             <a:r>
               <a:rPr lang="en-US" sz="2800" i="1" dirty="0"/>

</xml_diff>